<commit_message>
Updated Powerpoint with Jared's charts.
</commit_message>
<xml_diff>
--- a/Project1.pptx
+++ b/Project1.pptx
@@ -14,12 +14,14 @@
     <p:sldId id="270" r:id="rId8"/>
     <p:sldId id="262" r:id="rId9"/>
     <p:sldId id="263" r:id="rId10"/>
-    <p:sldId id="264" r:id="rId11"/>
-    <p:sldId id="265" r:id="rId12"/>
-    <p:sldId id="266" r:id="rId13"/>
-    <p:sldId id="267" r:id="rId14"/>
-    <p:sldId id="268" r:id="rId15"/>
-    <p:sldId id="269" r:id="rId16"/>
+    <p:sldId id="272" r:id="rId11"/>
+    <p:sldId id="264" r:id="rId12"/>
+    <p:sldId id="265" r:id="rId13"/>
+    <p:sldId id="273" r:id="rId14"/>
+    <p:sldId id="266" r:id="rId15"/>
+    <p:sldId id="267" r:id="rId16"/>
+    <p:sldId id="268" r:id="rId17"/>
+    <p:sldId id="269" r:id="rId18"/>
   </p:sldIdLst>
   <p:sldSz cx="12192000" cy="6858000"/>
   <p:notesSz cx="6858000" cy="9144000"/>
@@ -5981,6 +5983,135 @@
           <p:cNvPr id="2" name="Title 1">
             <a:extLst>
               <a:ext uri="{FF2B5EF4-FFF2-40B4-BE49-F238E27FC236}">
+                <a16:creationId xmlns:a16="http://schemas.microsoft.com/office/drawing/2014/main" id="{88B0A341-56A2-4FFE-97BF-47729CBA5126}"/>
+              </a:ext>
+            </a:extLst>
+          </p:cNvPr>
+          <p:cNvSpPr>
+            <a:spLocks noGrp="1"/>
+          </p:cNvSpPr>
+          <p:nvPr>
+            <p:ph type="title"/>
+          </p:nvPr>
+        </p:nvSpPr>
+        <p:spPr/>
+        <p:txBody>
+          <a:bodyPr/>
+          <a:lstStyle/>
+          <a:p>
+            <a:r>
+              <a:rPr lang="en-US" dirty="0"/>
+              <a:t>Average Trip Length by Temperature</a:t>
+            </a:r>
+          </a:p>
+        </p:txBody>
+      </p:sp>
+      <p:pic>
+        <p:nvPicPr>
+          <p:cNvPr id="5" name="Content Placeholder 4">
+            <a:extLst>
+              <a:ext uri="{FF2B5EF4-FFF2-40B4-BE49-F238E27FC236}">
+                <a16:creationId xmlns:a16="http://schemas.microsoft.com/office/drawing/2014/main" id="{3BBC26E1-8039-42A4-839C-A639AA673579}"/>
+              </a:ext>
+            </a:extLst>
+          </p:cNvPr>
+          <p:cNvPicPr>
+            <a:picLocks noGrp="1" noChangeAspect="1"/>
+          </p:cNvPicPr>
+          <p:nvPr>
+            <p:ph idx="1"/>
+          </p:nvPr>
+        </p:nvPicPr>
+        <p:blipFill>
+          <a:blip r:embed="rId2">
+            <a:extLst>
+              <a:ext uri="{28A0092B-C50C-407E-A947-70E740481C1C}">
+                <a14:useLocalDpi xmlns:a14="http://schemas.microsoft.com/office/drawing/2010/main" val="0"/>
+              </a:ext>
+            </a:extLst>
+          </a:blip>
+          <a:stretch>
+            <a:fillRect/>
+          </a:stretch>
+        </p:blipFill>
+        <p:spPr>
+          <a:xfrm>
+            <a:off x="218633" y="1930400"/>
+            <a:ext cx="5398729" cy="3531405"/>
+          </a:xfrm>
+        </p:spPr>
+      </p:pic>
+      <p:pic>
+        <p:nvPicPr>
+          <p:cNvPr id="7" name="Picture 6">
+            <a:extLst>
+              <a:ext uri="{FF2B5EF4-FFF2-40B4-BE49-F238E27FC236}">
+                <a16:creationId xmlns:a16="http://schemas.microsoft.com/office/drawing/2014/main" id="{650948AE-27EF-45DE-BBA8-E6A4E2059D4F}"/>
+              </a:ext>
+            </a:extLst>
+          </p:cNvPr>
+          <p:cNvPicPr>
+            <a:picLocks noChangeAspect="1"/>
+          </p:cNvPicPr>
+          <p:nvPr/>
+        </p:nvPicPr>
+        <p:blipFill>
+          <a:blip r:embed="rId3">
+            <a:extLst>
+              <a:ext uri="{28A0092B-C50C-407E-A947-70E740481C1C}">
+                <a14:useLocalDpi xmlns:a14="http://schemas.microsoft.com/office/drawing/2010/main" val="0"/>
+              </a:ext>
+            </a:extLst>
+          </a:blip>
+          <a:stretch>
+            <a:fillRect/>
+          </a:stretch>
+        </p:blipFill>
+        <p:spPr>
+          <a:xfrm>
+            <a:off x="6235959" y="1930399"/>
+            <a:ext cx="5398730" cy="3531405"/>
+          </a:xfrm>
+          <a:prstGeom prst="rect">
+            <a:avLst/>
+          </a:prstGeom>
+        </p:spPr>
+      </p:pic>
+    </p:spTree>
+    <p:extLst>
+      <p:ext uri="{BB962C8B-B14F-4D97-AF65-F5344CB8AC3E}">
+        <p14:creationId xmlns:p14="http://schemas.microsoft.com/office/powerpoint/2010/main" val="4218295833"/>
+      </p:ext>
+    </p:extLst>
+  </p:cSld>
+  <p:clrMapOvr>
+    <a:masterClrMapping/>
+  </p:clrMapOvr>
+</p:sld>
+</file>
+
+<file path=ppt/slides/slide11.xml><?xml version="1.0" encoding="utf-8"?>
+<p:sld xmlns:a="http://schemas.openxmlformats.org/drawingml/2006/main" xmlns:r="http://schemas.openxmlformats.org/officeDocument/2006/relationships" xmlns:p="http://schemas.openxmlformats.org/presentationml/2006/main">
+  <p:cSld>
+    <p:spTree>
+      <p:nvGrpSpPr>
+        <p:cNvPr id="1" name=""/>
+        <p:cNvGrpSpPr/>
+        <p:nvPr/>
+      </p:nvGrpSpPr>
+      <p:grpSpPr>
+        <a:xfrm>
+          <a:off x="0" y="0"/>
+          <a:ext cx="0" cy="0"/>
+          <a:chOff x="0" y="0"/>
+          <a:chExt cx="0" cy="0"/>
+        </a:xfrm>
+      </p:grpSpPr>
+      <p:sp>
+        <p:nvSpPr>
+          <p:cNvPr id="2" name="Title 1">
+            <a:extLst>
+              <a:ext uri="{FF2B5EF4-FFF2-40B4-BE49-F238E27FC236}">
                 <a16:creationId xmlns:a16="http://schemas.microsoft.com/office/drawing/2014/main" id="{E94E1036-8D13-4826-9862-681E9CC8E878}"/>
               </a:ext>
             </a:extLst>
@@ -6052,7 +6183,7 @@
 </p:sld>
 </file>
 
-<file path=ppt/slides/slide11.xml><?xml version="1.0" encoding="utf-8"?>
+<file path=ppt/slides/slide12.xml><?xml version="1.0" encoding="utf-8"?>
 <p:sld xmlns:a="http://schemas.openxmlformats.org/drawingml/2006/main" xmlns:r="http://schemas.openxmlformats.org/officeDocument/2006/relationships" xmlns:p="http://schemas.openxmlformats.org/presentationml/2006/main">
   <p:cSld>
     <p:spTree>
@@ -6145,7 +6276,136 @@
 </p:sld>
 </file>
 
-<file path=ppt/slides/slide12.xml><?xml version="1.0" encoding="utf-8"?>
+<file path=ppt/slides/slide13.xml><?xml version="1.0" encoding="utf-8"?>
+<p:sld xmlns:a="http://schemas.openxmlformats.org/drawingml/2006/main" xmlns:r="http://schemas.openxmlformats.org/officeDocument/2006/relationships" xmlns:p="http://schemas.openxmlformats.org/presentationml/2006/main">
+  <p:cSld>
+    <p:spTree>
+      <p:nvGrpSpPr>
+        <p:cNvPr id="1" name=""/>
+        <p:cNvGrpSpPr/>
+        <p:nvPr/>
+      </p:nvGrpSpPr>
+      <p:grpSpPr>
+        <a:xfrm>
+          <a:off x="0" y="0"/>
+          <a:ext cx="0" cy="0"/>
+          <a:chOff x="0" y="0"/>
+          <a:chExt cx="0" cy="0"/>
+        </a:xfrm>
+      </p:grpSpPr>
+      <p:sp>
+        <p:nvSpPr>
+          <p:cNvPr id="2" name="Title 1">
+            <a:extLst>
+              <a:ext uri="{FF2B5EF4-FFF2-40B4-BE49-F238E27FC236}">
+                <a16:creationId xmlns:a16="http://schemas.microsoft.com/office/drawing/2014/main" id="{FB8B1E5B-B7C4-4233-96A9-81A214B4E7DC}"/>
+              </a:ext>
+            </a:extLst>
+          </p:cNvPr>
+          <p:cNvSpPr>
+            <a:spLocks noGrp="1"/>
+          </p:cNvSpPr>
+          <p:nvPr>
+            <p:ph type="title"/>
+          </p:nvPr>
+        </p:nvSpPr>
+        <p:spPr/>
+        <p:txBody>
+          <a:bodyPr/>
+          <a:lstStyle/>
+          <a:p>
+            <a:r>
+              <a:rPr lang="en-US" dirty="0"/>
+              <a:t>Tips per Ride</a:t>
+            </a:r>
+          </a:p>
+        </p:txBody>
+      </p:sp>
+      <p:pic>
+        <p:nvPicPr>
+          <p:cNvPr id="5" name="Content Placeholder 4">
+            <a:extLst>
+              <a:ext uri="{FF2B5EF4-FFF2-40B4-BE49-F238E27FC236}">
+                <a16:creationId xmlns:a16="http://schemas.microsoft.com/office/drawing/2014/main" id="{F5BA1F4A-BCE9-46D7-A646-9AE3B861FE61}"/>
+              </a:ext>
+            </a:extLst>
+          </p:cNvPr>
+          <p:cNvPicPr>
+            <a:picLocks noGrp="1" noChangeAspect="1"/>
+          </p:cNvPicPr>
+          <p:nvPr>
+            <p:ph idx="1"/>
+          </p:nvPr>
+        </p:nvPicPr>
+        <p:blipFill>
+          <a:blip r:embed="rId2">
+            <a:extLst>
+              <a:ext uri="{28A0092B-C50C-407E-A947-70E740481C1C}">
+                <a14:useLocalDpi xmlns:a14="http://schemas.microsoft.com/office/drawing/2010/main" val="0"/>
+              </a:ext>
+            </a:extLst>
+          </a:blip>
+          <a:stretch>
+            <a:fillRect/>
+          </a:stretch>
+        </p:blipFill>
+        <p:spPr>
+          <a:xfrm>
+            <a:off x="6096000" y="1944720"/>
+            <a:ext cx="5765896" cy="3403226"/>
+          </a:xfrm>
+        </p:spPr>
+      </p:pic>
+      <p:pic>
+        <p:nvPicPr>
+          <p:cNvPr id="7" name="Picture 6">
+            <a:extLst>
+              <a:ext uri="{FF2B5EF4-FFF2-40B4-BE49-F238E27FC236}">
+                <a16:creationId xmlns:a16="http://schemas.microsoft.com/office/drawing/2014/main" id="{5331D111-8EF5-4E43-9FD5-5EF6E60F3963}"/>
+              </a:ext>
+            </a:extLst>
+          </p:cNvPr>
+          <p:cNvPicPr>
+            <a:picLocks noChangeAspect="1"/>
+          </p:cNvPicPr>
+          <p:nvPr/>
+        </p:nvPicPr>
+        <p:blipFill>
+          <a:blip r:embed="rId3">
+            <a:extLst>
+              <a:ext uri="{28A0092B-C50C-407E-A947-70E740481C1C}">
+                <a14:useLocalDpi xmlns:a14="http://schemas.microsoft.com/office/drawing/2010/main" val="0"/>
+              </a:ext>
+            </a:extLst>
+          </a:blip>
+          <a:stretch>
+            <a:fillRect/>
+          </a:stretch>
+        </p:blipFill>
+        <p:spPr>
+          <a:xfrm>
+            <a:off x="145485" y="2008531"/>
+            <a:ext cx="5765897" cy="3339416"/>
+          </a:xfrm>
+          <a:prstGeom prst="rect">
+            <a:avLst/>
+          </a:prstGeom>
+        </p:spPr>
+      </p:pic>
+    </p:spTree>
+    <p:extLst>
+      <p:ext uri="{BB962C8B-B14F-4D97-AF65-F5344CB8AC3E}">
+        <p14:creationId xmlns:p14="http://schemas.microsoft.com/office/powerpoint/2010/main" val="612273192"/>
+      </p:ext>
+    </p:extLst>
+  </p:cSld>
+  <p:clrMapOvr>
+    <a:masterClrMapping/>
+  </p:clrMapOvr>
+</p:sld>
+</file>
+
+<file path=ppt/slides/slide14.xml><?xml version="1.0" encoding="utf-8"?>
 <p:sld xmlns:a="http://schemas.openxmlformats.org/drawingml/2006/main" xmlns:r="http://schemas.openxmlformats.org/officeDocument/2006/relationships" xmlns:p="http://schemas.openxmlformats.org/presentationml/2006/main">
   <p:cSld>
     <p:spTree>
@@ -6238,7 +6498,7 @@
 </p:sld>
 </file>
 
-<file path=ppt/slides/slide13.xml><?xml version="1.0" encoding="utf-8"?>
+<file path=ppt/slides/slide15.xml><?xml version="1.0" encoding="utf-8"?>
 <p:sld xmlns:a="http://schemas.openxmlformats.org/drawingml/2006/main" xmlns:r="http://schemas.openxmlformats.org/officeDocument/2006/relationships" xmlns:p="http://schemas.openxmlformats.org/presentationml/2006/main">
   <p:cSld>
     <p:spTree>
@@ -6342,7 +6602,7 @@
 </p:sld>
 </file>
 
-<file path=ppt/slides/slide14.xml><?xml version="1.0" encoding="utf-8"?>
+<file path=ppt/slides/slide16.xml><?xml version="1.0" encoding="utf-8"?>
 <p:sld xmlns:a="http://schemas.openxmlformats.org/drawingml/2006/main" xmlns:r="http://schemas.openxmlformats.org/officeDocument/2006/relationships" xmlns:p="http://schemas.openxmlformats.org/presentationml/2006/main">
   <p:cSld>
     <p:spTree>
@@ -6487,7 +6747,7 @@
 </p:sld>
 </file>
 
-<file path=ppt/slides/slide15.xml><?xml version="1.0" encoding="utf-8"?>
+<file path=ppt/slides/slide17.xml><?xml version="1.0" encoding="utf-8"?>
 <p:sld xmlns:a="http://schemas.openxmlformats.org/drawingml/2006/main" xmlns:r="http://schemas.openxmlformats.org/officeDocument/2006/relationships" xmlns:p="http://schemas.openxmlformats.org/presentationml/2006/main">
   <p:cSld>
     <p:spTree>

</xml_diff>

<commit_message>
Replaced Powerpoint Show file with current Powerpoint
</commit_message>
<xml_diff>
--- a/Project1.pptx
+++ b/Project1.pptx
@@ -11,17 +11,16 @@
     <p:sldId id="259" r:id="rId5"/>
     <p:sldId id="260" r:id="rId6"/>
     <p:sldId id="261" r:id="rId7"/>
-    <p:sldId id="270" r:id="rId8"/>
-    <p:sldId id="262" r:id="rId9"/>
-    <p:sldId id="263" r:id="rId10"/>
-    <p:sldId id="272" r:id="rId11"/>
-    <p:sldId id="264" r:id="rId12"/>
-    <p:sldId id="265" r:id="rId13"/>
-    <p:sldId id="273" r:id="rId14"/>
-    <p:sldId id="266" r:id="rId15"/>
-    <p:sldId id="267" r:id="rId16"/>
-    <p:sldId id="268" r:id="rId17"/>
-    <p:sldId id="269" r:id="rId18"/>
+    <p:sldId id="262" r:id="rId8"/>
+    <p:sldId id="263" r:id="rId9"/>
+    <p:sldId id="272" r:id="rId10"/>
+    <p:sldId id="264" r:id="rId11"/>
+    <p:sldId id="265" r:id="rId12"/>
+    <p:sldId id="273" r:id="rId13"/>
+    <p:sldId id="266" r:id="rId14"/>
+    <p:sldId id="267" r:id="rId15"/>
+    <p:sldId id="268" r:id="rId16"/>
+    <p:sldId id="269" r:id="rId17"/>
   </p:sldIdLst>
   <p:sldSz cx="12192000" cy="6858000"/>
   <p:notesSz cx="6858000" cy="9144000"/>
@@ -5983,135 +5982,6 @@
           <p:cNvPr id="2" name="Title 1">
             <a:extLst>
               <a:ext uri="{FF2B5EF4-FFF2-40B4-BE49-F238E27FC236}">
-                <a16:creationId xmlns:a16="http://schemas.microsoft.com/office/drawing/2014/main" id="{88B0A341-56A2-4FFE-97BF-47729CBA5126}"/>
-              </a:ext>
-            </a:extLst>
-          </p:cNvPr>
-          <p:cNvSpPr>
-            <a:spLocks noGrp="1"/>
-          </p:cNvSpPr>
-          <p:nvPr>
-            <p:ph type="title"/>
-          </p:nvPr>
-        </p:nvSpPr>
-        <p:spPr/>
-        <p:txBody>
-          <a:bodyPr/>
-          <a:lstStyle/>
-          <a:p>
-            <a:r>
-              <a:rPr lang="en-US" dirty="0"/>
-              <a:t>Average Trip Length by Temperature</a:t>
-            </a:r>
-          </a:p>
-        </p:txBody>
-      </p:sp>
-      <p:pic>
-        <p:nvPicPr>
-          <p:cNvPr id="5" name="Content Placeholder 4">
-            <a:extLst>
-              <a:ext uri="{FF2B5EF4-FFF2-40B4-BE49-F238E27FC236}">
-                <a16:creationId xmlns:a16="http://schemas.microsoft.com/office/drawing/2014/main" id="{3BBC26E1-8039-42A4-839C-A639AA673579}"/>
-              </a:ext>
-            </a:extLst>
-          </p:cNvPr>
-          <p:cNvPicPr>
-            <a:picLocks noGrp="1" noChangeAspect="1"/>
-          </p:cNvPicPr>
-          <p:nvPr>
-            <p:ph idx="1"/>
-          </p:nvPr>
-        </p:nvPicPr>
-        <p:blipFill>
-          <a:blip r:embed="rId2">
-            <a:extLst>
-              <a:ext uri="{28A0092B-C50C-407E-A947-70E740481C1C}">
-                <a14:useLocalDpi xmlns:a14="http://schemas.microsoft.com/office/drawing/2010/main" val="0"/>
-              </a:ext>
-            </a:extLst>
-          </a:blip>
-          <a:stretch>
-            <a:fillRect/>
-          </a:stretch>
-        </p:blipFill>
-        <p:spPr>
-          <a:xfrm>
-            <a:off x="218633" y="1930400"/>
-            <a:ext cx="5398729" cy="3531405"/>
-          </a:xfrm>
-        </p:spPr>
-      </p:pic>
-      <p:pic>
-        <p:nvPicPr>
-          <p:cNvPr id="7" name="Picture 6">
-            <a:extLst>
-              <a:ext uri="{FF2B5EF4-FFF2-40B4-BE49-F238E27FC236}">
-                <a16:creationId xmlns:a16="http://schemas.microsoft.com/office/drawing/2014/main" id="{650948AE-27EF-45DE-BBA8-E6A4E2059D4F}"/>
-              </a:ext>
-            </a:extLst>
-          </p:cNvPr>
-          <p:cNvPicPr>
-            <a:picLocks noChangeAspect="1"/>
-          </p:cNvPicPr>
-          <p:nvPr/>
-        </p:nvPicPr>
-        <p:blipFill>
-          <a:blip r:embed="rId3">
-            <a:extLst>
-              <a:ext uri="{28A0092B-C50C-407E-A947-70E740481C1C}">
-                <a14:useLocalDpi xmlns:a14="http://schemas.microsoft.com/office/drawing/2010/main" val="0"/>
-              </a:ext>
-            </a:extLst>
-          </a:blip>
-          <a:stretch>
-            <a:fillRect/>
-          </a:stretch>
-        </p:blipFill>
-        <p:spPr>
-          <a:xfrm>
-            <a:off x="6235959" y="1930399"/>
-            <a:ext cx="5398730" cy="3531405"/>
-          </a:xfrm>
-          <a:prstGeom prst="rect">
-            <a:avLst/>
-          </a:prstGeom>
-        </p:spPr>
-      </p:pic>
-    </p:spTree>
-    <p:extLst>
-      <p:ext uri="{BB962C8B-B14F-4D97-AF65-F5344CB8AC3E}">
-        <p14:creationId xmlns:p14="http://schemas.microsoft.com/office/powerpoint/2010/main" val="4218295833"/>
-      </p:ext>
-    </p:extLst>
-  </p:cSld>
-  <p:clrMapOvr>
-    <a:masterClrMapping/>
-  </p:clrMapOvr>
-</p:sld>
-</file>
-
-<file path=ppt/slides/slide11.xml><?xml version="1.0" encoding="utf-8"?>
-<p:sld xmlns:a="http://schemas.openxmlformats.org/drawingml/2006/main" xmlns:r="http://schemas.openxmlformats.org/officeDocument/2006/relationships" xmlns:p="http://schemas.openxmlformats.org/presentationml/2006/main">
-  <p:cSld>
-    <p:spTree>
-      <p:nvGrpSpPr>
-        <p:cNvPr id="1" name=""/>
-        <p:cNvGrpSpPr/>
-        <p:nvPr/>
-      </p:nvGrpSpPr>
-      <p:grpSpPr>
-        <a:xfrm>
-          <a:off x="0" y="0"/>
-          <a:ext cx="0" cy="0"/>
-          <a:chOff x="0" y="0"/>
-          <a:chExt cx="0" cy="0"/>
-        </a:xfrm>
-      </p:grpSpPr>
-      <p:sp>
-        <p:nvSpPr>
-          <p:cNvPr id="2" name="Title 1">
-            <a:extLst>
-              <a:ext uri="{FF2B5EF4-FFF2-40B4-BE49-F238E27FC236}">
                 <a16:creationId xmlns:a16="http://schemas.microsoft.com/office/drawing/2014/main" id="{E94E1036-8D13-4826-9862-681E9CC8E878}"/>
               </a:ext>
             </a:extLst>
@@ -6183,7 +6053,7 @@
 </p:sld>
 </file>
 
-<file path=ppt/slides/slide12.xml><?xml version="1.0" encoding="utf-8"?>
+<file path=ppt/slides/slide11.xml><?xml version="1.0" encoding="utf-8"?>
 <p:sld xmlns:a="http://schemas.openxmlformats.org/drawingml/2006/main" xmlns:r="http://schemas.openxmlformats.org/officeDocument/2006/relationships" xmlns:p="http://schemas.openxmlformats.org/presentationml/2006/main">
   <p:cSld>
     <p:spTree>
@@ -6276,7 +6146,7 @@
 </p:sld>
 </file>
 
-<file path=ppt/slides/slide13.xml><?xml version="1.0" encoding="utf-8"?>
+<file path=ppt/slides/slide12.xml><?xml version="1.0" encoding="utf-8"?>
 <p:sld xmlns:a="http://schemas.openxmlformats.org/drawingml/2006/main" xmlns:r="http://schemas.openxmlformats.org/officeDocument/2006/relationships" xmlns:p="http://schemas.openxmlformats.org/presentationml/2006/main">
   <p:cSld>
     <p:spTree>
@@ -6405,7 +6275,7 @@
 </p:sld>
 </file>
 
-<file path=ppt/slides/slide14.xml><?xml version="1.0" encoding="utf-8"?>
+<file path=ppt/slides/slide13.xml><?xml version="1.0" encoding="utf-8"?>
 <p:sld xmlns:a="http://schemas.openxmlformats.org/drawingml/2006/main" xmlns:r="http://schemas.openxmlformats.org/officeDocument/2006/relationships" xmlns:p="http://schemas.openxmlformats.org/presentationml/2006/main">
   <p:cSld>
     <p:spTree>
@@ -6498,6 +6368,110 @@
 </p:sld>
 </file>
 
+<file path=ppt/slides/slide14.xml><?xml version="1.0" encoding="utf-8"?>
+<p:sld xmlns:a="http://schemas.openxmlformats.org/drawingml/2006/main" xmlns:r="http://schemas.openxmlformats.org/officeDocument/2006/relationships" xmlns:p="http://schemas.openxmlformats.org/presentationml/2006/main">
+  <p:cSld>
+    <p:spTree>
+      <p:nvGrpSpPr>
+        <p:cNvPr id="1" name=""/>
+        <p:cNvGrpSpPr/>
+        <p:nvPr/>
+      </p:nvGrpSpPr>
+      <p:grpSpPr>
+        <a:xfrm>
+          <a:off x="0" y="0"/>
+          <a:ext cx="0" cy="0"/>
+          <a:chOff x="0" y="0"/>
+          <a:chExt cx="0" cy="0"/>
+        </a:xfrm>
+      </p:grpSpPr>
+      <p:sp>
+        <p:nvSpPr>
+          <p:cNvPr id="2" name="Title 1">
+            <a:extLst>
+              <a:ext uri="{FF2B5EF4-FFF2-40B4-BE49-F238E27FC236}">
+                <a16:creationId xmlns:a16="http://schemas.microsoft.com/office/drawing/2014/main" id="{1C462221-9AC9-431A-A34C-E7FF2CF70FC2}"/>
+              </a:ext>
+            </a:extLst>
+          </p:cNvPr>
+          <p:cNvSpPr>
+            <a:spLocks noGrp="1"/>
+          </p:cNvSpPr>
+          <p:nvPr>
+            <p:ph type="title"/>
+          </p:nvPr>
+        </p:nvSpPr>
+        <p:spPr/>
+        <p:txBody>
+          <a:bodyPr/>
+          <a:lstStyle/>
+          <a:p>
+            <a:r>
+              <a:rPr lang="en-US" dirty="0"/>
+              <a:t>Findings and Discussion</a:t>
+            </a:r>
+          </a:p>
+        </p:txBody>
+      </p:sp>
+      <p:sp>
+        <p:nvSpPr>
+          <p:cNvPr id="3" name="Content Placeholder 2">
+            <a:extLst>
+              <a:ext uri="{FF2B5EF4-FFF2-40B4-BE49-F238E27FC236}">
+                <a16:creationId xmlns:a16="http://schemas.microsoft.com/office/drawing/2014/main" id="{AE2CEDC5-E314-4895-AC30-2174F1812FF8}"/>
+              </a:ext>
+            </a:extLst>
+          </p:cNvPr>
+          <p:cNvSpPr>
+            <a:spLocks noGrp="1"/>
+          </p:cNvSpPr>
+          <p:nvPr>
+            <p:ph idx="1"/>
+          </p:nvPr>
+        </p:nvSpPr>
+        <p:spPr/>
+        <p:txBody>
+          <a:bodyPr/>
+          <a:lstStyle/>
+          <a:p>
+            <a:r>
+              <a:rPr lang="en-US" dirty="0"/>
+              <a:t>Hypothesis was dead wrong – more trips on days with good weather than those with bad weather</a:t>
+            </a:r>
+          </a:p>
+          <a:p>
+            <a:r>
+              <a:rPr lang="en-US" dirty="0"/>
+              <a:t>People going out more on clear days?</a:t>
+            </a:r>
+          </a:p>
+          <a:p>
+            <a:r>
+              <a:rPr lang="en-US" dirty="0"/>
+              <a:t>Public transit faster than cabs in bad weather?</a:t>
+            </a:r>
+          </a:p>
+          <a:p>
+            <a:r>
+              <a:rPr lang="en-US" dirty="0"/>
+              <a:t>Better moods in good weather?</a:t>
+            </a:r>
+          </a:p>
+        </p:txBody>
+      </p:sp>
+    </p:spTree>
+    <p:extLst>
+      <p:ext uri="{BB962C8B-B14F-4D97-AF65-F5344CB8AC3E}">
+        <p14:creationId xmlns:p14="http://schemas.microsoft.com/office/powerpoint/2010/main" val="1243520135"/>
+      </p:ext>
+    </p:extLst>
+  </p:cSld>
+  <p:clrMapOvr>
+    <a:masterClrMapping/>
+  </p:clrMapOvr>
+</p:sld>
+</file>
+
 <file path=ppt/slides/slide15.xml><?xml version="1.0" encoding="utf-8"?>
 <p:sld xmlns:a="http://schemas.openxmlformats.org/drawingml/2006/main" xmlns:r="http://schemas.openxmlformats.org/officeDocument/2006/relationships" xmlns:p="http://schemas.openxmlformats.org/presentationml/2006/main">
   <p:cSld>
@@ -6520,110 +6494,6 @@
           <p:cNvPr id="2" name="Title 1">
             <a:extLst>
               <a:ext uri="{FF2B5EF4-FFF2-40B4-BE49-F238E27FC236}">
-                <a16:creationId xmlns:a16="http://schemas.microsoft.com/office/drawing/2014/main" id="{1C462221-9AC9-431A-A34C-E7FF2CF70FC2}"/>
-              </a:ext>
-            </a:extLst>
-          </p:cNvPr>
-          <p:cNvSpPr>
-            <a:spLocks noGrp="1"/>
-          </p:cNvSpPr>
-          <p:nvPr>
-            <p:ph type="title"/>
-          </p:nvPr>
-        </p:nvSpPr>
-        <p:spPr/>
-        <p:txBody>
-          <a:bodyPr/>
-          <a:lstStyle/>
-          <a:p>
-            <a:r>
-              <a:rPr lang="en-US" dirty="0"/>
-              <a:t>Findings and Discussion</a:t>
-            </a:r>
-          </a:p>
-        </p:txBody>
-      </p:sp>
-      <p:sp>
-        <p:nvSpPr>
-          <p:cNvPr id="3" name="Content Placeholder 2">
-            <a:extLst>
-              <a:ext uri="{FF2B5EF4-FFF2-40B4-BE49-F238E27FC236}">
-                <a16:creationId xmlns:a16="http://schemas.microsoft.com/office/drawing/2014/main" id="{AE2CEDC5-E314-4895-AC30-2174F1812FF8}"/>
-              </a:ext>
-            </a:extLst>
-          </p:cNvPr>
-          <p:cNvSpPr>
-            <a:spLocks noGrp="1"/>
-          </p:cNvSpPr>
-          <p:nvPr>
-            <p:ph idx="1"/>
-          </p:nvPr>
-        </p:nvSpPr>
-        <p:spPr/>
-        <p:txBody>
-          <a:bodyPr/>
-          <a:lstStyle/>
-          <a:p>
-            <a:r>
-              <a:rPr lang="en-US" dirty="0"/>
-              <a:t>Hypothesis was dead wrong – more trips on days with good weather than those with bad weather</a:t>
-            </a:r>
-          </a:p>
-          <a:p>
-            <a:r>
-              <a:rPr lang="en-US" dirty="0"/>
-              <a:t>People going out more on clear days?</a:t>
-            </a:r>
-          </a:p>
-          <a:p>
-            <a:r>
-              <a:rPr lang="en-US" dirty="0"/>
-              <a:t>Public transit faster than cabs in bad weather?</a:t>
-            </a:r>
-          </a:p>
-          <a:p>
-            <a:r>
-              <a:rPr lang="en-US" dirty="0"/>
-              <a:t>Better moods in good weather?</a:t>
-            </a:r>
-          </a:p>
-        </p:txBody>
-      </p:sp>
-    </p:spTree>
-    <p:extLst>
-      <p:ext uri="{BB962C8B-B14F-4D97-AF65-F5344CB8AC3E}">
-        <p14:creationId xmlns:p14="http://schemas.microsoft.com/office/powerpoint/2010/main" val="1243520135"/>
-      </p:ext>
-    </p:extLst>
-  </p:cSld>
-  <p:clrMapOvr>
-    <a:masterClrMapping/>
-  </p:clrMapOvr>
-</p:sld>
-</file>
-
-<file path=ppt/slides/slide16.xml><?xml version="1.0" encoding="utf-8"?>
-<p:sld xmlns:a="http://schemas.openxmlformats.org/drawingml/2006/main" xmlns:r="http://schemas.openxmlformats.org/officeDocument/2006/relationships" xmlns:p="http://schemas.openxmlformats.org/presentationml/2006/main">
-  <p:cSld>
-    <p:spTree>
-      <p:nvGrpSpPr>
-        <p:cNvPr id="1" name=""/>
-        <p:cNvGrpSpPr/>
-        <p:nvPr/>
-      </p:nvGrpSpPr>
-      <p:grpSpPr>
-        <a:xfrm>
-          <a:off x="0" y="0"/>
-          <a:ext cx="0" cy="0"/>
-          <a:chOff x="0" y="0"/>
-          <a:chExt cx="0" cy="0"/>
-        </a:xfrm>
-      </p:grpSpPr>
-      <p:sp>
-        <p:nvSpPr>
-          <p:cNvPr id="2" name="Title 1">
-            <a:extLst>
-              <a:ext uri="{FF2B5EF4-FFF2-40B4-BE49-F238E27FC236}">
                 <a16:creationId xmlns:a16="http://schemas.microsoft.com/office/drawing/2014/main" id="{0F9E3A67-72C4-44BB-B0FB-E1EF1A7EB399}"/>
               </a:ext>
             </a:extLst>
@@ -6747,7 +6617,7 @@
 </p:sld>
 </file>
 
-<file path=ppt/slides/slide17.xml><?xml version="1.0" encoding="utf-8"?>
+<file path=ppt/slides/slide16.xml><?xml version="1.0" encoding="utf-8"?>
 <p:sld xmlns:a="http://schemas.openxmlformats.org/drawingml/2006/main" xmlns:r="http://schemas.openxmlformats.org/officeDocument/2006/relationships" xmlns:p="http://schemas.openxmlformats.org/presentationml/2006/main">
   <p:cSld>
     <p:spTree>
@@ -7383,99 +7253,6 @@
           <p:cNvPr id="2" name="Title 1">
             <a:extLst>
               <a:ext uri="{FF2B5EF4-FFF2-40B4-BE49-F238E27FC236}">
-                <a16:creationId xmlns:a16="http://schemas.microsoft.com/office/drawing/2014/main" id="{5970E643-0695-467E-B964-EAACD40FE29C}"/>
-              </a:ext>
-            </a:extLst>
-          </p:cNvPr>
-          <p:cNvSpPr>
-            <a:spLocks noGrp="1"/>
-          </p:cNvSpPr>
-          <p:nvPr>
-            <p:ph type="title"/>
-          </p:nvPr>
-        </p:nvSpPr>
-        <p:spPr/>
-        <p:txBody>
-          <a:bodyPr/>
-          <a:lstStyle/>
-          <a:p>
-            <a:r>
-              <a:rPr lang="en-US" dirty="0"/>
-              <a:t>Tips by Payment Method</a:t>
-            </a:r>
-          </a:p>
-        </p:txBody>
-      </p:sp>
-      <p:pic>
-        <p:nvPicPr>
-          <p:cNvPr id="5" name="Content Placeholder 4">
-            <a:extLst>
-              <a:ext uri="{FF2B5EF4-FFF2-40B4-BE49-F238E27FC236}">
-                <a16:creationId xmlns:a16="http://schemas.microsoft.com/office/drawing/2014/main" id="{3946E46F-27F7-4138-B058-558881DF2DB9}"/>
-              </a:ext>
-            </a:extLst>
-          </p:cNvPr>
-          <p:cNvPicPr>
-            <a:picLocks noGrp="1" noChangeAspect="1"/>
-          </p:cNvPicPr>
-          <p:nvPr>
-            <p:ph idx="1"/>
-          </p:nvPr>
-        </p:nvPicPr>
-        <p:blipFill>
-          <a:blip r:embed="rId2">
-            <a:extLst>
-              <a:ext uri="{28A0092B-C50C-407E-A947-70E740481C1C}">
-                <a14:useLocalDpi xmlns:a14="http://schemas.microsoft.com/office/drawing/2010/main" val="0"/>
-              </a:ext>
-            </a:extLst>
-          </a:blip>
-          <a:stretch>
-            <a:fillRect/>
-          </a:stretch>
-        </p:blipFill>
-        <p:spPr>
-          <a:xfrm>
-            <a:off x="1063690" y="1431446"/>
-            <a:ext cx="7557796" cy="5157610"/>
-          </a:xfrm>
-        </p:spPr>
-      </p:pic>
-    </p:spTree>
-    <p:extLst>
-      <p:ext uri="{BB962C8B-B14F-4D97-AF65-F5344CB8AC3E}">
-        <p14:creationId xmlns:p14="http://schemas.microsoft.com/office/powerpoint/2010/main" val="2917925028"/>
-      </p:ext>
-    </p:extLst>
-  </p:cSld>
-  <p:clrMapOvr>
-    <a:masterClrMapping/>
-  </p:clrMapOvr>
-</p:sld>
-</file>
-
-<file path=ppt/slides/slide8.xml><?xml version="1.0" encoding="utf-8"?>
-<p:sld xmlns:a="http://schemas.openxmlformats.org/drawingml/2006/main" xmlns:r="http://schemas.openxmlformats.org/officeDocument/2006/relationships" xmlns:p="http://schemas.openxmlformats.org/presentationml/2006/main">
-  <p:cSld>
-    <p:spTree>
-      <p:nvGrpSpPr>
-        <p:cNvPr id="1" name=""/>
-        <p:cNvGrpSpPr/>
-        <p:nvPr/>
-      </p:nvGrpSpPr>
-      <p:grpSpPr>
-        <a:xfrm>
-          <a:off x="0" y="0"/>
-          <a:ext cx="0" cy="0"/>
-          <a:chOff x="0" y="0"/>
-          <a:chExt cx="0" cy="0"/>
-        </a:xfrm>
-      </p:grpSpPr>
-      <p:sp>
-        <p:nvSpPr>
-          <p:cNvPr id="2" name="Title 1">
-            <a:extLst>
-              <a:ext uri="{FF2B5EF4-FFF2-40B4-BE49-F238E27FC236}">
                 <a16:creationId xmlns:a16="http://schemas.microsoft.com/office/drawing/2014/main" id="{975525B6-1489-45FC-861E-BF8A92C361B5}"/>
               </a:ext>
             </a:extLst>
@@ -7547,7 +7324,7 @@
 </p:sld>
 </file>
 
-<file path=ppt/slides/slide9.xml><?xml version="1.0" encoding="utf-8"?>
+<file path=ppt/slides/slide8.xml><?xml version="1.0" encoding="utf-8"?>
 <p:sld xmlns:a="http://schemas.openxmlformats.org/drawingml/2006/main" xmlns:r="http://schemas.openxmlformats.org/officeDocument/2006/relationships" xmlns:p="http://schemas.openxmlformats.org/presentationml/2006/main">
   <p:cSld>
     <p:spTree>
@@ -7631,6 +7408,135 @@
     <p:extLst>
       <p:ext uri="{BB962C8B-B14F-4D97-AF65-F5344CB8AC3E}">
         <p14:creationId xmlns:p14="http://schemas.microsoft.com/office/powerpoint/2010/main" val="3395645206"/>
+      </p:ext>
+    </p:extLst>
+  </p:cSld>
+  <p:clrMapOvr>
+    <a:masterClrMapping/>
+  </p:clrMapOvr>
+</p:sld>
+</file>
+
+<file path=ppt/slides/slide9.xml><?xml version="1.0" encoding="utf-8"?>
+<p:sld xmlns:a="http://schemas.openxmlformats.org/drawingml/2006/main" xmlns:r="http://schemas.openxmlformats.org/officeDocument/2006/relationships" xmlns:p="http://schemas.openxmlformats.org/presentationml/2006/main">
+  <p:cSld>
+    <p:spTree>
+      <p:nvGrpSpPr>
+        <p:cNvPr id="1" name=""/>
+        <p:cNvGrpSpPr/>
+        <p:nvPr/>
+      </p:nvGrpSpPr>
+      <p:grpSpPr>
+        <a:xfrm>
+          <a:off x="0" y="0"/>
+          <a:ext cx="0" cy="0"/>
+          <a:chOff x="0" y="0"/>
+          <a:chExt cx="0" cy="0"/>
+        </a:xfrm>
+      </p:grpSpPr>
+      <p:sp>
+        <p:nvSpPr>
+          <p:cNvPr id="2" name="Title 1">
+            <a:extLst>
+              <a:ext uri="{FF2B5EF4-FFF2-40B4-BE49-F238E27FC236}">
+                <a16:creationId xmlns:a16="http://schemas.microsoft.com/office/drawing/2014/main" id="{88B0A341-56A2-4FFE-97BF-47729CBA5126}"/>
+              </a:ext>
+            </a:extLst>
+          </p:cNvPr>
+          <p:cNvSpPr>
+            <a:spLocks noGrp="1"/>
+          </p:cNvSpPr>
+          <p:nvPr>
+            <p:ph type="title"/>
+          </p:nvPr>
+        </p:nvSpPr>
+        <p:spPr/>
+        <p:txBody>
+          <a:bodyPr/>
+          <a:lstStyle/>
+          <a:p>
+            <a:r>
+              <a:rPr lang="en-US" dirty="0"/>
+              <a:t>Average Trip Length by Temperature</a:t>
+            </a:r>
+          </a:p>
+        </p:txBody>
+      </p:sp>
+      <p:pic>
+        <p:nvPicPr>
+          <p:cNvPr id="5" name="Content Placeholder 4">
+            <a:extLst>
+              <a:ext uri="{FF2B5EF4-FFF2-40B4-BE49-F238E27FC236}">
+                <a16:creationId xmlns:a16="http://schemas.microsoft.com/office/drawing/2014/main" id="{3BBC26E1-8039-42A4-839C-A639AA673579}"/>
+              </a:ext>
+            </a:extLst>
+          </p:cNvPr>
+          <p:cNvPicPr>
+            <a:picLocks noGrp="1" noChangeAspect="1"/>
+          </p:cNvPicPr>
+          <p:nvPr>
+            <p:ph idx="1"/>
+          </p:nvPr>
+        </p:nvPicPr>
+        <p:blipFill>
+          <a:blip r:embed="rId2">
+            <a:extLst>
+              <a:ext uri="{28A0092B-C50C-407E-A947-70E740481C1C}">
+                <a14:useLocalDpi xmlns:a14="http://schemas.microsoft.com/office/drawing/2010/main" val="0"/>
+              </a:ext>
+            </a:extLst>
+          </a:blip>
+          <a:stretch>
+            <a:fillRect/>
+          </a:stretch>
+        </p:blipFill>
+        <p:spPr>
+          <a:xfrm>
+            <a:off x="218633" y="1930400"/>
+            <a:ext cx="5398729" cy="3531405"/>
+          </a:xfrm>
+        </p:spPr>
+      </p:pic>
+      <p:pic>
+        <p:nvPicPr>
+          <p:cNvPr id="7" name="Picture 6">
+            <a:extLst>
+              <a:ext uri="{FF2B5EF4-FFF2-40B4-BE49-F238E27FC236}">
+                <a16:creationId xmlns:a16="http://schemas.microsoft.com/office/drawing/2014/main" id="{650948AE-27EF-45DE-BBA8-E6A4E2059D4F}"/>
+              </a:ext>
+            </a:extLst>
+          </p:cNvPr>
+          <p:cNvPicPr>
+            <a:picLocks noChangeAspect="1"/>
+          </p:cNvPicPr>
+          <p:nvPr/>
+        </p:nvPicPr>
+        <p:blipFill>
+          <a:blip r:embed="rId3">
+            <a:extLst>
+              <a:ext uri="{28A0092B-C50C-407E-A947-70E740481C1C}">
+                <a14:useLocalDpi xmlns:a14="http://schemas.microsoft.com/office/drawing/2010/main" val="0"/>
+              </a:ext>
+            </a:extLst>
+          </a:blip>
+          <a:stretch>
+            <a:fillRect/>
+          </a:stretch>
+        </p:blipFill>
+        <p:spPr>
+          <a:xfrm>
+            <a:off x="6235959" y="1930399"/>
+            <a:ext cx="5398730" cy="3531405"/>
+          </a:xfrm>
+          <a:prstGeom prst="rect">
+            <a:avLst/>
+          </a:prstGeom>
+        </p:spPr>
+      </p:pic>
+    </p:spTree>
+    <p:extLst>
+      <p:ext uri="{BB962C8B-B14F-4D97-AF65-F5344CB8AC3E}">
+        <p14:creationId xmlns:p14="http://schemas.microsoft.com/office/powerpoint/2010/main" val="4218295833"/>
       </p:ext>
     </p:extLst>
   </p:cSld>

</xml_diff>